<commit_message>
Add google form for submission in slides and README
</commit_message>
<xml_diff>
--- a/slideshow/WLU_AR_Day_Activity_Instructions.pptx
+++ b/slideshow/WLU_AR_Day_Activity_Instructions.pptx
@@ -16,10 +16,10 @@
     <p:sldId id="265" r:id="rId7"/>
     <p:sldId id="259" r:id="rId8"/>
     <p:sldId id="264" r:id="rId9"/>
-    <p:sldId id="267" r:id="rId10"/>
-    <p:sldId id="268" r:id="rId11"/>
-    <p:sldId id="272" r:id="rId12"/>
-    <p:sldId id="266" r:id="rId13"/>
+    <p:sldId id="266" r:id="rId10"/>
+    <p:sldId id="267" r:id="rId11"/>
+    <p:sldId id="268" r:id="rId12"/>
+    <p:sldId id="272" r:id="rId13"/>
     <p:sldId id="271" r:id="rId14"/>
     <p:sldId id="263" r:id="rId15"/>
   </p:sldIdLst>
@@ -124,6 +124,9 @@
     <p:ext uri="{EFAFB233-063F-42B5-8137-9DF3F51BA10A}">
       <p15:sldGuideLst xmlns:p15="http://schemas.microsoft.com/office/powerpoint/2012/main"/>
     </p:ext>
+    <p:ext uri="{2D200454-40CA-4A62-9FC3-DE9A4176ACB9}">
+      <p15:notesGuideLst xmlns:p15="http://schemas.microsoft.com/office/powerpoint/2012/main"/>
+    </p:ext>
   </p:extLst>
 </p:presentation>
 </file>
@@ -210,7 +213,7 @@
           <a:p>
             <a:fld id="{0AE82908-D569-E74B-B506-5DFEAB200A16}" type="datetimeFigureOut">
               <a:rPr lang="en-US" smtClean="0"/>
-              <a:t>2/14/25</a:t>
+              <a:t>2/21/25</a:t>
             </a:fld>
             <a:endParaRPr lang="en-US"/>
           </a:p>
@@ -626,7 +629,7 @@
           <a:p>
             <a:fld id="{81079ACE-5C61-0541-A2A6-7B055A924A2A}" type="slidenum">
               <a:rPr lang="en-US" smtClean="0"/>
-              <a:t>11</a:t>
+              <a:t>12</a:t>
             </a:fld>
             <a:endParaRPr lang="en-US"/>
           </a:p>
@@ -792,7 +795,7 @@
           <a:p>
             <a:fld id="{9B66F5D3-20F9-0E4D-8AAD-873D65CA5B8C}" type="datetimeFigureOut">
               <a:rPr lang="en-US" smtClean="0"/>
-              <a:t>2/14/25</a:t>
+              <a:t>2/21/25</a:t>
             </a:fld>
             <a:endParaRPr lang="en-US"/>
           </a:p>
@@ -990,7 +993,7 @@
           <a:p>
             <a:fld id="{9B66F5D3-20F9-0E4D-8AAD-873D65CA5B8C}" type="datetimeFigureOut">
               <a:rPr lang="en-US" smtClean="0"/>
-              <a:t>2/14/25</a:t>
+              <a:t>2/21/25</a:t>
             </a:fld>
             <a:endParaRPr lang="en-US"/>
           </a:p>
@@ -1198,7 +1201,7 @@
           <a:p>
             <a:fld id="{9B66F5D3-20F9-0E4D-8AAD-873D65CA5B8C}" type="datetimeFigureOut">
               <a:rPr lang="en-US" smtClean="0"/>
-              <a:t>2/14/25</a:t>
+              <a:t>2/21/25</a:t>
             </a:fld>
             <a:endParaRPr lang="en-US"/>
           </a:p>
@@ -1396,7 +1399,7 @@
           <a:p>
             <a:fld id="{9B66F5D3-20F9-0E4D-8AAD-873D65CA5B8C}" type="datetimeFigureOut">
               <a:rPr lang="en-US" smtClean="0"/>
-              <a:t>2/14/25</a:t>
+              <a:t>2/21/25</a:t>
             </a:fld>
             <a:endParaRPr lang="en-US"/>
           </a:p>
@@ -1671,7 +1674,7 @@
           <a:p>
             <a:fld id="{9B66F5D3-20F9-0E4D-8AAD-873D65CA5B8C}" type="datetimeFigureOut">
               <a:rPr lang="en-US" smtClean="0"/>
-              <a:t>2/14/25</a:t>
+              <a:t>2/21/25</a:t>
             </a:fld>
             <a:endParaRPr lang="en-US"/>
           </a:p>
@@ -1936,7 +1939,7 @@
           <a:p>
             <a:fld id="{9B66F5D3-20F9-0E4D-8AAD-873D65CA5B8C}" type="datetimeFigureOut">
               <a:rPr lang="en-US" smtClean="0"/>
-              <a:t>2/14/25</a:t>
+              <a:t>2/21/25</a:t>
             </a:fld>
             <a:endParaRPr lang="en-US"/>
           </a:p>
@@ -2348,7 +2351,7 @@
           <a:p>
             <a:fld id="{9B66F5D3-20F9-0E4D-8AAD-873D65CA5B8C}" type="datetimeFigureOut">
               <a:rPr lang="en-US" smtClean="0"/>
-              <a:t>2/14/25</a:t>
+              <a:t>2/21/25</a:t>
             </a:fld>
             <a:endParaRPr lang="en-US"/>
           </a:p>
@@ -2489,7 +2492,7 @@
           <a:p>
             <a:fld id="{9B66F5D3-20F9-0E4D-8AAD-873D65CA5B8C}" type="datetimeFigureOut">
               <a:rPr lang="en-US" smtClean="0"/>
-              <a:t>2/14/25</a:t>
+              <a:t>2/21/25</a:t>
             </a:fld>
             <a:endParaRPr lang="en-US"/>
           </a:p>
@@ -2602,7 +2605,7 @@
           <a:p>
             <a:fld id="{9B66F5D3-20F9-0E4D-8AAD-873D65CA5B8C}" type="datetimeFigureOut">
               <a:rPr lang="en-US" smtClean="0"/>
-              <a:t>2/14/25</a:t>
+              <a:t>2/21/25</a:t>
             </a:fld>
             <a:endParaRPr lang="en-US"/>
           </a:p>
@@ -2913,7 +2916,7 @@
           <a:p>
             <a:fld id="{9B66F5D3-20F9-0E4D-8AAD-873D65CA5B8C}" type="datetimeFigureOut">
               <a:rPr lang="en-US" smtClean="0"/>
-              <a:t>2/14/25</a:t>
+              <a:t>2/21/25</a:t>
             </a:fld>
             <a:endParaRPr lang="en-US"/>
           </a:p>
@@ -3201,7 +3204,7 @@
           <a:p>
             <a:fld id="{9B66F5D3-20F9-0E4D-8AAD-873D65CA5B8C}" type="datetimeFigureOut">
               <a:rPr lang="en-US" smtClean="0"/>
-              <a:t>2/14/25</a:t>
+              <a:t>2/21/25</a:t>
             </a:fld>
             <a:endParaRPr lang="en-US"/>
           </a:p>
@@ -3442,7 +3445,7 @@
           <a:p>
             <a:fld id="{9B66F5D3-20F9-0E4D-8AAD-873D65CA5B8C}" type="datetimeFigureOut">
               <a:rPr lang="en-US" smtClean="0"/>
-              <a:t>2/14/25</a:t>
+              <a:t>2/21/25</a:t>
             </a:fld>
             <a:endParaRPr lang="en-US"/>
           </a:p>
@@ -3933,7 +3936,7 @@
           <p:cNvPr id="2" name="Title 1">
             <a:extLst>
               <a:ext uri="{FF2B5EF4-FFF2-40B4-BE49-F238E27FC236}">
-                <a16:creationId xmlns:a16="http://schemas.microsoft.com/office/drawing/2014/main" id="{C47278D4-F46F-FC18-56D7-7F3138510573}"/>
+                <a16:creationId xmlns:a16="http://schemas.microsoft.com/office/drawing/2014/main" id="{53C7C39F-70A1-81DB-597D-C08787C03A25}"/>
               </a:ext>
             </a:extLst>
           </p:cNvPr>
@@ -3951,7 +3954,7 @@
           <a:p>
             <a:r>
               <a:rPr lang="en-US" dirty="0"/>
-              <a:t>How the Game Decides What to Run</a:t>
+              <a:t>How to Run the Game </a:t>
             </a:r>
           </a:p>
         </p:txBody>
@@ -3961,7 +3964,7 @@
           <p:cNvPr id="3" name="Content Placeholder 2">
             <a:extLst>
               <a:ext uri="{FF2B5EF4-FFF2-40B4-BE49-F238E27FC236}">
-                <a16:creationId xmlns:a16="http://schemas.microsoft.com/office/drawing/2014/main" id="{1CC0F8E8-45AB-56C6-7EA1-5B76BB51A7CB}"/>
+                <a16:creationId xmlns:a16="http://schemas.microsoft.com/office/drawing/2014/main" id="{29B2C057-A096-F073-56F5-FEC9E0126DE3}"/>
               </a:ext>
             </a:extLst>
           </p:cNvPr>
@@ -3974,119 +3977,115 @@
         </p:nvSpPr>
         <p:spPr>
           <a:xfrm>
-            <a:off x="838200" y="1825624"/>
-            <a:ext cx="10515600" cy="4758055"/>
+            <a:off x="838200" y="1612900"/>
+            <a:ext cx="10515600" cy="4879975"/>
           </a:xfrm>
         </p:spPr>
         <p:txBody>
           <a:bodyPr>
-            <a:normAutofit fontScale="92500" lnSpcReduction="20000"/>
+            <a:normAutofit/>
           </a:bodyPr>
           <a:lstStyle/>
           <a:p>
             <a:r>
               <a:rPr lang="en-US" dirty="0"/>
-              <a:t>In the top level directory of the game code is a file: </a:t>
+              <a:t>Make sure you have Python installed (preferably 3.9 or later)</a:t>
             </a:r>
           </a:p>
           <a:p>
             <a:pPr lvl="1"/>
             <a:r>
-              <a:rPr lang="en-US" dirty="0" err="1">
-                <a:solidFill>
-                  <a:srgbClr val="000000"/>
-                </a:solidFill>
-                <a:effectLst/>
-                <a:latin typeface="Menlo" panose="020B0609030804020204" pitchFamily="49" charset="0"/>
+              <a:rPr lang="en-US" dirty="0"/>
+              <a:t>Check by running `python3 --version`</a:t>
+            </a:r>
+            <a:endParaRPr lang="en-US" dirty="0">
+              <a:hlinkClick r:id="rId2"/>
+            </a:endParaRPr>
+          </a:p>
+          <a:p>
+            <a:pPr lvl="1"/>
+            <a:r>
+              <a:rPr lang="en-US" dirty="0">
+                <a:hlinkClick r:id="rId2"/>
               </a:rPr>
-              <a:t>player_agents_list.txt</a:t>
-            </a:r>
-            <a:endParaRPr lang="en-US" dirty="0">
-              <a:solidFill>
-                <a:srgbClr val="000000"/>
-              </a:solidFill>
-              <a:effectLst/>
-              <a:latin typeface="Menlo" panose="020B0609030804020204" pitchFamily="49" charset="0"/>
-            </a:endParaRPr>
-          </a:p>
-          <a:p>
+              <a:t>https://www.python.org/downloads/release/python-3115/</a:t>
+            </a:r>
             <a:r>
               <a:rPr lang="en-US" dirty="0"/>
-              <a:t>The </a:t>
+              <a:t> </a:t>
+            </a:r>
+          </a:p>
+          <a:p>
+            <a:r>
+              <a:rPr lang="en-US" dirty="0"/>
+              <a:t>Setup the game source code:</a:t>
+            </a:r>
+          </a:p>
+          <a:p>
+            <a:pPr lvl="1"/>
+            <a:r>
+              <a:rPr lang="en-US" dirty="0"/>
+              <a:t>Download or clone the starter code from </a:t>
+            </a:r>
+            <a:r>
+              <a:rPr lang="en-US" dirty="0">
+                <a:hlinkClick r:id="rId3"/>
+              </a:rPr>
+              <a:t>https://github.com/collinwzw/AR_Day_2025</a:t>
+            </a:r>
+            <a:endParaRPr lang="en-US" dirty="0"/>
+          </a:p>
+          <a:p>
+            <a:pPr lvl="1"/>
+            <a:r>
+              <a:rPr lang="en-US" dirty="0"/>
+              <a:t>cd into the directory</a:t>
+            </a:r>
+          </a:p>
+          <a:p>
+            <a:pPr lvl="1"/>
+            <a:r>
+              <a:rPr lang="en-US" dirty="0"/>
+              <a:t>Install requirements with `python3 -m pip install -r </a:t>
             </a:r>
             <a:r>
               <a:rPr lang="en-US" dirty="0" err="1"/>
+              <a:t>requirements.txt</a:t>
+            </a:r>
+            <a:r>
+              <a:rPr lang="en-US" dirty="0"/>
+              <a:t>`</a:t>
+            </a:r>
+          </a:p>
+          <a:p>
+            <a:pPr lvl="1"/>
+            <a:r>
+              <a:rPr lang="en-US" dirty="0"/>
+              <a:t>Run the game with </a:t>
+            </a:r>
+            <a:r>
+              <a:rPr lang="en-US" sz="1800" dirty="0"/>
+              <a:t>`</a:t>
+            </a:r>
+            <a:r>
+              <a:rPr lang="en-US" sz="2000" dirty="0"/>
+              <a:t>python3 </a:t>
+            </a:r>
+            <a:r>
+              <a:rPr lang="en-US" sz="2000" dirty="0" err="1"/>
               <a:t>main.py</a:t>
             </a:r>
             <a:r>
-              <a:rPr lang="en-US" dirty="0"/>
-              <a:t> function will try to run all levels of the game for every agent class listed in this file</a:t>
-            </a:r>
-          </a:p>
-          <a:p>
-            <a:pPr lvl="1"/>
-            <a:r>
-              <a:rPr lang="en-US" dirty="0"/>
-              <a:t>Agents must be separated by a newline</a:t>
-            </a:r>
-          </a:p>
-          <a:p>
-            <a:r>
-              <a:rPr lang="en-US" dirty="0"/>
-              <a:t>If an agent fails a level, the remaining levels will not be run</a:t>
-            </a:r>
-          </a:p>
-          <a:p>
-            <a:endParaRPr lang="en-US" dirty="0"/>
-          </a:p>
-          <a:p>
-            <a:r>
-              <a:rPr lang="en-US" dirty="0"/>
-              <a:t>[TIP] To test your code faster, modify the agent list file to only have your agent</a:t>
-            </a:r>
-          </a:p>
-          <a:p>
-            <a:r>
-              <a:rPr lang="en-US" dirty="0"/>
-              <a:t>[TIP] The game currently runs at a speed of 2, adjust this parameter in </a:t>
-            </a:r>
-            <a:r>
-              <a:rPr lang="en-US" dirty="0" err="1"/>
-              <a:t>GameConfig.py</a:t>
-            </a:r>
-            <a:r>
-              <a:rPr lang="en-US" dirty="0"/>
-              <a:t> to make your tests run faster</a:t>
-            </a:r>
-          </a:p>
-          <a:p>
-            <a:r>
-              <a:rPr lang="en-US" dirty="0"/>
-              <a:t>[TIP] To test one level at a time, comment out unwanted levels in the GAME_LEVELS variable in </a:t>
-            </a:r>
-            <a:r>
-              <a:rPr lang="en-US" dirty="0" err="1"/>
-              <a:t>src</a:t>
-            </a:r>
-            <a:r>
-              <a:rPr lang="en-US" dirty="0"/>
-              <a:t>/</a:t>
-            </a:r>
-            <a:r>
-              <a:rPr lang="en-US" dirty="0" err="1"/>
-              <a:t>GameConfig.py</a:t>
-            </a:r>
-            <a:endParaRPr lang="en-US" dirty="0"/>
-          </a:p>
-          <a:p>
-            <a:endParaRPr lang="en-US" dirty="0"/>
+              <a:rPr lang="en-US" sz="1800" dirty="0"/>
+              <a:t>`</a:t>
+            </a:r>
           </a:p>
         </p:txBody>
       </p:sp>
     </p:spTree>
     <p:extLst>
       <p:ext uri="{BB962C8B-B14F-4D97-AF65-F5344CB8AC3E}">
-        <p14:creationId xmlns:p14="http://schemas.microsoft.com/office/powerpoint/2010/main" val="4252095957"/>
+        <p14:creationId xmlns:p14="http://schemas.microsoft.com/office/powerpoint/2010/main" val="2149089065"/>
       </p:ext>
     </p:extLst>
   </p:cSld>
@@ -4136,7 +4135,7 @@
           <a:p>
             <a:r>
               <a:rPr lang="en-US" dirty="0"/>
-              <a:t>How the Game is Scored</a:t>
+              <a:t>How the Game Decides What to Run</a:t>
             </a:r>
           </a:p>
         </p:txBody>
@@ -4165,54 +4164,113 @@
         </p:spPr>
         <p:txBody>
           <a:bodyPr>
-            <a:normAutofit/>
+            <a:normAutofit fontScale="92500" lnSpcReduction="20000"/>
           </a:bodyPr>
           <a:lstStyle/>
           <a:p>
             <a:r>
               <a:rPr lang="en-US" dirty="0"/>
-              <a:t>Each move costs 1 point, you want to have the lowest cost</a:t>
+              <a:t>In the top level directory of the game code is a file: </a:t>
             </a:r>
           </a:p>
           <a:p>
             <a:pPr lvl="1"/>
             <a:r>
+              <a:rPr lang="en-US" dirty="0" err="1">
+                <a:solidFill>
+                  <a:srgbClr val="000000"/>
+                </a:solidFill>
+                <a:effectLst/>
+                <a:latin typeface="Menlo" panose="020B0609030804020204" pitchFamily="49" charset="0"/>
+              </a:rPr>
+              <a:t>player_agents_list.txt</a:t>
+            </a:r>
+            <a:endParaRPr lang="en-US" dirty="0">
+              <a:solidFill>
+                <a:srgbClr val="000000"/>
+              </a:solidFill>
+              <a:effectLst/>
+              <a:latin typeface="Menlo" panose="020B0609030804020204" pitchFamily="49" charset="0"/>
+            </a:endParaRPr>
+          </a:p>
+          <a:p>
+            <a:r>
               <a:rPr lang="en-US" dirty="0"/>
-              <a:t>Score is displayed in the upper left corner of the game window</a:t>
-            </a:r>
-          </a:p>
-          <a:p>
+              <a:t>The </a:t>
+            </a:r>
+            <a:r>
+              <a:rPr lang="en-US" dirty="0" err="1"/>
+              <a:t>main.py</a:t>
+            </a:r>
             <a:r>
               <a:rPr lang="en-US" dirty="0"/>
-              <a:t>The game will timeout after 1000 turns</a:t>
-            </a:r>
-          </a:p>
-          <a:p>
+              <a:t> function will try to run all levels of the game for every agent class listed in this file</a:t>
+            </a:r>
+          </a:p>
+          <a:p>
+            <a:pPr lvl="1"/>
             <a:r>
               <a:rPr lang="en-US" dirty="0"/>
-              <a:t>Agent scores are sorted in the following order:</a:t>
-            </a:r>
-          </a:p>
-          <a:p>
-            <a:pPr lvl="1"/>
+              <a:t>Agents must be separated by a newline</a:t>
+            </a:r>
+          </a:p>
+          <a:p>
             <a:r>
               <a:rPr lang="en-US" dirty="0"/>
-              <a:t>Number of levels completed</a:t>
-            </a:r>
-          </a:p>
-          <a:p>
-            <a:pPr lvl="1"/>
+              <a:t>If an agent fails a level, the remaining levels will not be run</a:t>
+            </a:r>
+          </a:p>
+          <a:p>
+            <a:endParaRPr lang="en-US" dirty="0"/>
+          </a:p>
+          <a:p>
             <a:r>
               <a:rPr lang="en-US" dirty="0"/>
-              <a:t>Tiebreak: Score for last level</a:t>
-            </a:r>
+              <a:t>[TIP] To test your code faster, modify the agent list file to only have your agent</a:t>
+            </a:r>
+          </a:p>
+          <a:p>
+            <a:r>
+              <a:rPr lang="en-US" dirty="0"/>
+              <a:t>[TIP] The game currently runs at a speed of 5, adjust this parameter in </a:t>
+            </a:r>
+            <a:r>
+              <a:rPr lang="en-US" dirty="0" err="1"/>
+              <a:t>GameConfig.py</a:t>
+            </a:r>
+            <a:r>
+              <a:rPr lang="en-US" dirty="0"/>
+              <a:t> to make your tests run faster</a:t>
+            </a:r>
+          </a:p>
+          <a:p>
+            <a:r>
+              <a:rPr lang="en-US" dirty="0"/>
+              <a:t>[TIP] To test one level at a time, comment out unwanted levels in the GAME_LEVELS variable in </a:t>
+            </a:r>
+            <a:r>
+              <a:rPr lang="en-US" dirty="0" err="1"/>
+              <a:t>src</a:t>
+            </a:r>
+            <a:r>
+              <a:rPr lang="en-US" dirty="0"/>
+              <a:t>/</a:t>
+            </a:r>
+            <a:r>
+              <a:rPr lang="en-US" dirty="0" err="1"/>
+              <a:t>GameConfig.py</a:t>
+            </a:r>
+            <a:endParaRPr lang="en-US" dirty="0"/>
+          </a:p>
+          <a:p>
+            <a:endParaRPr lang="en-US" dirty="0"/>
           </a:p>
         </p:txBody>
       </p:sp>
     </p:spTree>
     <p:extLst>
       <p:ext uri="{BB962C8B-B14F-4D97-AF65-F5344CB8AC3E}">
-        <p14:creationId xmlns:p14="http://schemas.microsoft.com/office/powerpoint/2010/main" val="238152860"/>
+        <p14:creationId xmlns:p14="http://schemas.microsoft.com/office/powerpoint/2010/main" val="4252095957"/>
       </p:ext>
     </p:extLst>
   </p:cSld>
@@ -4244,7 +4302,7 @@
           <p:cNvPr id="2" name="Title 1">
             <a:extLst>
               <a:ext uri="{FF2B5EF4-FFF2-40B4-BE49-F238E27FC236}">
-                <a16:creationId xmlns:a16="http://schemas.microsoft.com/office/drawing/2014/main" id="{7D6DA3C9-2180-05BC-A3FC-A1BE104FD4D8}"/>
+                <a16:creationId xmlns:a16="http://schemas.microsoft.com/office/drawing/2014/main" id="{C47278D4-F46F-FC18-56D7-7F3138510573}"/>
               </a:ext>
             </a:extLst>
           </p:cNvPr>
@@ -4262,7 +4320,7 @@
           <a:p>
             <a:r>
               <a:rPr lang="en-US" dirty="0"/>
-              <a:t>Example Agent Class</a:t>
+              <a:t>How the Game is Scored</a:t>
             </a:r>
           </a:p>
         </p:txBody>
@@ -4272,7 +4330,7 @@
           <p:cNvPr id="3" name="Content Placeholder 2">
             <a:extLst>
               <a:ext uri="{FF2B5EF4-FFF2-40B4-BE49-F238E27FC236}">
-                <a16:creationId xmlns:a16="http://schemas.microsoft.com/office/drawing/2014/main" id="{2D8498E2-2D34-53B6-A203-B5C09EBB1E82}"/>
+                <a16:creationId xmlns:a16="http://schemas.microsoft.com/office/drawing/2014/main" id="{1CC0F8E8-45AB-56C6-7EA1-5B76BB51A7CB}"/>
               </a:ext>
             </a:extLst>
           </p:cNvPr>
@@ -4285,8 +4343,8 @@
         </p:nvSpPr>
         <p:spPr>
           <a:xfrm>
-            <a:off x="838200" y="1825625"/>
-            <a:ext cx="10515600" cy="4764362"/>
+            <a:off x="838200" y="1825624"/>
+            <a:ext cx="10515600" cy="4758055"/>
           </a:xfrm>
         </p:spPr>
         <p:txBody>
@@ -4296,29 +4354,41 @@
           <a:lstStyle/>
           <a:p>
             <a:r>
-              <a:rPr lang="en-US" dirty="0" err="1"/>
-              <a:t>find_shortest_path</a:t>
-            </a:r>
-            <a:r>
               <a:rPr lang="en-US" dirty="0"/>
-              <a:t> function is given in the file. Use this helper function as a search algorithm to find the shortest path and determine the next move</a:t>
-            </a:r>
-          </a:p>
-          <a:p>
+              <a:t>Each move costs 1 point, you want to have the lowest cost</a:t>
+            </a:r>
+          </a:p>
+          <a:p>
+            <a:pPr lvl="1"/>
             <a:r>
               <a:rPr lang="en-US" dirty="0"/>
-              <a:t>[TIP] Think about implementing collision logic</a:t>
+              <a:t>Score is displayed in the upper left corner of the game window</a:t>
+            </a:r>
+          </a:p>
+          <a:p>
+            <a:r>
+              <a:rPr lang="en-US" dirty="0"/>
+              <a:t>The game will timeout after 1000 turns</a:t>
+            </a:r>
+          </a:p>
+          <a:p>
+            <a:r>
+              <a:rPr lang="en-US" dirty="0"/>
+              <a:t>Agent scores are sorted in the following order:</a:t>
             </a:r>
           </a:p>
           <a:p>
             <a:pPr lvl="1"/>
             <a:r>
-              <a:rPr lang="en-US" dirty="0" err="1"/>
-              <a:t>will_next_state_collide</a:t>
-            </a:r>
-            <a:r>
               <a:rPr lang="en-US" dirty="0"/>
-              <a:t>() function is yet to be implemented</a:t>
+              <a:t>Number of levels completed</a:t>
+            </a:r>
+          </a:p>
+          <a:p>
+            <a:pPr lvl="1"/>
+            <a:r>
+              <a:rPr lang="en-US" dirty="0"/>
+              <a:t>Tiebreak: Score for last level</a:t>
             </a:r>
           </a:p>
         </p:txBody>
@@ -4326,7 +4396,7 @@
     </p:spTree>
     <p:extLst>
       <p:ext uri="{BB962C8B-B14F-4D97-AF65-F5344CB8AC3E}">
-        <p14:creationId xmlns:p14="http://schemas.microsoft.com/office/powerpoint/2010/main" val="429266294"/>
+        <p14:creationId xmlns:p14="http://schemas.microsoft.com/office/powerpoint/2010/main" val="238152860"/>
       </p:ext>
     </p:extLst>
   </p:cSld>
@@ -4447,50 +4517,18 @@
           <a:p>
             <a:r>
               <a:rPr lang="en-US" dirty="0"/>
-              <a:t>Once your agent code is complete:</a:t>
+              <a:t>Once your agent code is complete, submit your file here:</a:t>
             </a:r>
           </a:p>
           <a:p>
             <a:pPr lvl="1"/>
-            <a:r>
-              <a:rPr lang="en-US" dirty="0"/>
-              <a:t>Push your code onto your repository</a:t>
-            </a:r>
-          </a:p>
-          <a:p>
-            <a:pPr lvl="1"/>
-            <a:r>
-              <a:rPr lang="en-US" dirty="0"/>
-              <a:t>Create a Pull Request onto </a:t>
-            </a:r>
             <a:r>
               <a:rPr lang="en-US" dirty="0">
                 <a:hlinkClick r:id="rId2"/>
               </a:rPr>
-              <a:t>https://github.com/collinwzw/AR_Day_2025</a:t>
+              <a:t>https://forms.gle/4V5ttpQFLyexmVQY6</a:t>
             </a:r>
             <a:endParaRPr lang="en-US" dirty="0"/>
-          </a:p>
-          <a:p>
-            <a:pPr lvl="1"/>
-            <a:r>
-              <a:rPr lang="en-US" dirty="0"/>
-              <a:t>In your Pull Request description, include </a:t>
-            </a:r>
-          </a:p>
-          <a:p>
-            <a:pPr lvl="2"/>
-            <a:r>
-              <a:rPr lang="en-US" dirty="0"/>
-              <a:t>Your name and your team members names, if any</a:t>
-            </a:r>
-          </a:p>
-          <a:p>
-            <a:pPr lvl="2"/>
-            <a:r>
-              <a:rPr lang="en-US" dirty="0"/>
-              <a:t>Screenshot of your score in the furthest level you made it to</a:t>
-            </a:r>
           </a:p>
         </p:txBody>
       </p:sp>
@@ -7515,7 +7553,7 @@
         <p:spPr/>
         <p:txBody>
           <a:bodyPr>
-            <a:normAutofit fontScale="92500" lnSpcReduction="10000"/>
+            <a:normAutofit/>
           </a:bodyPr>
           <a:lstStyle/>
           <a:p>
@@ -7525,163 +7563,73 @@
             </a:r>
           </a:p>
           <a:p>
-            <a:pPr lvl="1"/>
-            <a:r>
-              <a:rPr lang="en-US" sz="1800" dirty="0" err="1"/>
-              <a:t>sensor_data</a:t>
-            </a:r>
-            <a:r>
-              <a:rPr lang="en-US" sz="1800" dirty="0"/>
-              <a:t> = {</a:t>
-            </a:r>
-          </a:p>
-          <a:p>
-            <a:pPr marL="457200" lvl="1" indent="0">
+            <a:pPr marL="0" indent="0">
               <a:buNone/>
             </a:pPr>
-            <a:r>
-              <a:rPr lang="en-US" sz="1800" dirty="0"/>
-              <a:t>        </a:t>
-            </a:r>
-            <a:r>
-              <a:rPr lang="en-US" sz="1800" dirty="0" err="1"/>
-              <a:t>SensorData.FIELD_BOUNDARIES</a:t>
-            </a:r>
-            <a:r>
-              <a:rPr lang="en-US" sz="1800" dirty="0"/>
-              <a:t>: [[-1, -1], [-1, 0], ...],  </a:t>
-            </a:r>
-          </a:p>
-          <a:p>
-            <a:pPr marL="457200" lvl="1" indent="0">
+            <a:endParaRPr lang="en-US" dirty="0"/>
+          </a:p>
+          <a:p>
+            <a:pPr marL="0" indent="0">
               <a:buNone/>
             </a:pPr>
-            <a:r>
-              <a:rPr lang="en-US" sz="1800" dirty="0"/>
-              <a:t>        </a:t>
-            </a:r>
-            <a:r>
-              <a:rPr lang="en-US" sz="1800" dirty="0" err="1"/>
-              <a:t>SensorData.DRIVE_LOCATIONS</a:t>
-            </a:r>
-            <a:r>
-              <a:rPr lang="en-US" sz="1800" dirty="0"/>
-              <a:t>: [[x1, y1], [x2, y2], ...], </a:t>
-            </a:r>
-          </a:p>
-          <a:p>
-            <a:pPr marL="457200" lvl="1" indent="0">
+            <a:endParaRPr lang="en-US" dirty="0"/>
+          </a:p>
+          <a:p>
+            <a:pPr marL="0" indent="0">
               <a:buNone/>
             </a:pPr>
-            <a:r>
-              <a:rPr lang="en-US" sz="1800" dirty="0"/>
-              <a:t>        </a:t>
-            </a:r>
-            <a:r>
-              <a:rPr lang="en-US" sz="1800" dirty="0" err="1"/>
-              <a:t>SensorData.POD_LOCATIONS</a:t>
-            </a:r>
-            <a:r>
-              <a:rPr lang="en-US" sz="1800" dirty="0"/>
-              <a:t>: [[x1, y1], [x2, y2], ...],</a:t>
-            </a:r>
-          </a:p>
-          <a:p>
-            <a:pPr marL="457200" lvl="1" indent="0">
+            <a:endParaRPr lang="en-US" dirty="0"/>
+          </a:p>
+          <a:p>
+            <a:pPr marL="0" indent="0">
               <a:buNone/>
             </a:pPr>
-            <a:r>
-              <a:rPr lang="en-US" sz="1800" dirty="0"/>
-              <a:t>        </a:t>
-            </a:r>
-            <a:r>
-              <a:rPr lang="en-US" sz="1800" dirty="0" err="1"/>
-              <a:t>SensorData.PLAYER_LOCATION</a:t>
-            </a:r>
-            <a:r>
-              <a:rPr lang="en-US" sz="1800" dirty="0"/>
-              <a:t>: [x, y],</a:t>
-            </a:r>
-          </a:p>
-          <a:p>
-            <a:pPr marL="457200" lvl="1" indent="0">
+            <a:endParaRPr lang="en-US" dirty="0"/>
+          </a:p>
+          <a:p>
+            <a:pPr marL="0" indent="0">
               <a:buNone/>
             </a:pPr>
-            <a:r>
-              <a:rPr lang="en-US" sz="1800" dirty="0"/>
-              <a:t>        </a:t>
-            </a:r>
-            <a:r>
-              <a:rPr lang="en-US" sz="1800" dirty="0" err="1"/>
-              <a:t>SensorData.GOAL_LOCATIONS</a:t>
-            </a:r>
-            <a:r>
-              <a:rPr lang="en-US" sz="1800" dirty="0"/>
-              <a:t>: [[x1, y2], [x2, y2], [x3, y3],…]</a:t>
-            </a:r>
-          </a:p>
-          <a:p>
-            <a:pPr marL="457200" lvl="1" indent="0">
-              <a:buNone/>
-            </a:pPr>
-            <a:r>
-              <a:rPr lang="en-US" sz="1800" dirty="0"/>
-              <a:t>        </a:t>
-            </a:r>
-            <a:r>
-              <a:rPr lang="en-US" sz="1800" dirty="0" err="1"/>
-              <a:t>SensorData.TARGET_POD_LOCATION</a:t>
-            </a:r>
-            <a:r>
-              <a:rPr lang="en-US" sz="1800" dirty="0"/>
-              <a:t>: [x, y], # Only used for Advanced mode</a:t>
-            </a:r>
-          </a:p>
-          <a:p>
-            <a:pPr marL="457200" lvl="1" indent="0">
-              <a:buNone/>
-            </a:pPr>
-            <a:r>
-              <a:rPr lang="en-US" sz="1800" dirty="0"/>
-              <a:t>        </a:t>
-            </a:r>
-            <a:r>
-              <a:rPr lang="en-US" sz="1800" dirty="0" err="1"/>
-              <a:t>SensorData.DRIVE_LIFTED_POD_PAIRS</a:t>
-            </a:r>
-            <a:r>
-              <a:rPr lang="en-US" sz="1800" dirty="0"/>
-              <a:t>: [[drive_id_1, pod_id_1], [drive_id_2, pod_id_2], ...]</a:t>
-            </a:r>
-            <a:br>
-              <a:rPr lang="en-US" sz="1800" dirty="0"/>
-            </a:br>
-            <a:r>
-              <a:rPr lang="en-US" sz="1800" dirty="0"/>
-              <a:t>	        # Only used in Advanced mode for seeing which pods are currently lifted by drives</a:t>
-            </a:r>
-          </a:p>
-          <a:p>
-            <a:pPr marL="457200" lvl="1" indent="0">
-              <a:buNone/>
-            </a:pPr>
-            <a:r>
-              <a:rPr lang="en-US" sz="1800" dirty="0"/>
-              <a:t>    }</a:t>
-            </a:r>
-          </a:p>
-          <a:p>
-            <a:pPr lvl="1"/>
-            <a:endParaRPr lang="en-US" sz="1800" dirty="0"/>
+            <a:endParaRPr lang="en-US" dirty="0"/>
           </a:p>
           <a:p>
             <a:r>
               <a:rPr lang="en-US" sz="2200" dirty="0"/>
-              <a:t>Use this data to stay within the field, avoid collisions, pickup pods, and find the goal</a:t>
-            </a:r>
-          </a:p>
-        </p:txBody>
-      </p:sp>
+              <a:t>Use this data to find the pods and goals and determine the optimal path to them!</a:t>
+            </a:r>
+          </a:p>
+        </p:txBody>
+      </p:sp>
+      <p:pic>
+        <p:nvPicPr>
+          <p:cNvPr id="4" name="Picture 3">
+            <a:extLst>
+              <a:ext uri="{FF2B5EF4-FFF2-40B4-BE49-F238E27FC236}">
+                <a16:creationId xmlns:a16="http://schemas.microsoft.com/office/drawing/2014/main" id="{D8478637-92BA-6E21-A700-AAC4B9DE9559}"/>
+              </a:ext>
+            </a:extLst>
+          </p:cNvPr>
+          <p:cNvPicPr>
+            <a:picLocks noChangeAspect="1"/>
+          </p:cNvPicPr>
+          <p:nvPr/>
+        </p:nvPicPr>
+        <p:blipFill>
+          <a:blip r:embed="rId2"/>
+          <a:stretch>
+            <a:fillRect/>
+          </a:stretch>
+        </p:blipFill>
+        <p:spPr>
+          <a:xfrm>
+            <a:off x="838200" y="2811701"/>
+            <a:ext cx="10356981" cy="2379186"/>
+          </a:xfrm>
+          <a:prstGeom prst="rect">
+            <a:avLst/>
+          </a:prstGeom>
+        </p:spPr>
+      </p:pic>
     </p:spTree>
     <p:extLst>
       <p:ext uri="{BB962C8B-B14F-4D97-AF65-F5344CB8AC3E}">
@@ -7717,7 +7665,7 @@
           <p:cNvPr id="2" name="Title 1">
             <a:extLst>
               <a:ext uri="{FF2B5EF4-FFF2-40B4-BE49-F238E27FC236}">
-                <a16:creationId xmlns:a16="http://schemas.microsoft.com/office/drawing/2014/main" id="{53C7C39F-70A1-81DB-597D-C08787C03A25}"/>
+                <a16:creationId xmlns:a16="http://schemas.microsoft.com/office/drawing/2014/main" id="{7D6DA3C9-2180-05BC-A3FC-A1BE104FD4D8}"/>
               </a:ext>
             </a:extLst>
           </p:cNvPr>
@@ -7735,7 +7683,7 @@
           <a:p>
             <a:r>
               <a:rPr lang="en-US" dirty="0"/>
-              <a:t>How to Run the Game </a:t>
+              <a:t>Helper Code</a:t>
             </a:r>
           </a:p>
         </p:txBody>
@@ -7745,7 +7693,7 @@
           <p:cNvPr id="3" name="Content Placeholder 2">
             <a:extLst>
               <a:ext uri="{FF2B5EF4-FFF2-40B4-BE49-F238E27FC236}">
-                <a16:creationId xmlns:a16="http://schemas.microsoft.com/office/drawing/2014/main" id="{29B2C057-A096-F073-56F5-FEC9E0126DE3}"/>
+                <a16:creationId xmlns:a16="http://schemas.microsoft.com/office/drawing/2014/main" id="{2D8498E2-2D34-53B6-A203-B5C09EBB1E82}"/>
               </a:ext>
             </a:extLst>
           </p:cNvPr>
@@ -7758,8 +7706,8 @@
         </p:nvSpPr>
         <p:spPr>
           <a:xfrm>
-            <a:off x="838200" y="1612900"/>
-            <a:ext cx="10515600" cy="4879975"/>
+            <a:off x="838200" y="1825625"/>
+            <a:ext cx="10515600" cy="4764362"/>
           </a:xfrm>
         </p:spPr>
         <p:txBody>
@@ -7769,106 +7717,50 @@
           <a:lstStyle/>
           <a:p>
             <a:r>
+              <a:rPr lang="en-US" dirty="0" err="1"/>
+              <a:t>find_shortest_path</a:t>
+            </a:r>
+            <a:r>
               <a:rPr lang="en-US" dirty="0"/>
-              <a:t>Make sure you have Python installed (preferably 3.9 or later)</a:t>
-            </a:r>
-          </a:p>
-          <a:p>
-            <a:pPr lvl="1"/>
-            <a:r>
-              <a:rPr lang="en-US" dirty="0">
-                <a:hlinkClick r:id="rId2"/>
-              </a:rPr>
-              <a:t>https://www.python.org/downloads/release/python-3115/</a:t>
-            </a:r>
-            <a:r>
-              <a:rPr lang="en-US" dirty="0"/>
-              <a:t> </a:t>
-            </a:r>
-          </a:p>
-          <a:p>
-            <a:r>
-              <a:rPr lang="en-US" dirty="0"/>
-              <a:t>Setup the game source code:</a:t>
-            </a:r>
-          </a:p>
-          <a:p>
-            <a:pPr lvl="1"/>
-            <a:r>
-              <a:rPr lang="en-US" dirty="0"/>
-              <a:t>Fork the GitHub repository from </a:t>
-            </a:r>
-            <a:r>
-              <a:rPr lang="en-US" dirty="0">
-                <a:hlinkClick r:id="rId3"/>
-              </a:rPr>
-              <a:t>https://github.com/collinwzw/AR_Day_2025</a:t>
-            </a:r>
-            <a:endParaRPr lang="en-US" dirty="0"/>
-          </a:p>
-          <a:p>
-            <a:pPr lvl="1"/>
-            <a:r>
-              <a:rPr lang="en-US" dirty="0"/>
-              <a:t>Clone your forked repository using `git clone &lt;</a:t>
-            </a:r>
-            <a:r>
-              <a:rPr lang="en-US" dirty="0" err="1"/>
-              <a:t>your_repo_name</a:t>
-            </a:r>
-            <a:r>
-              <a:rPr lang="en-US" dirty="0"/>
-              <a:t>&gt;`</a:t>
-            </a:r>
-          </a:p>
-          <a:p>
-            <a:r>
-              <a:rPr lang="en-US" sz="2400" dirty="0"/>
-              <a:t>Install requirements</a:t>
-            </a:r>
-          </a:p>
-          <a:p>
-            <a:pPr lvl="1"/>
-            <a:r>
-              <a:rPr lang="en-US" sz="2000" dirty="0"/>
-              <a:t>Command line: `python3 -m pip install -r </a:t>
-            </a:r>
-            <a:r>
-              <a:rPr lang="en-US" sz="2000" dirty="0" err="1"/>
-              <a:t>requirements.txt</a:t>
-            </a:r>
-            <a:r>
-              <a:rPr lang="en-US" sz="2000" dirty="0"/>
-              <a:t>`</a:t>
-            </a:r>
-          </a:p>
-          <a:p>
-            <a:r>
-              <a:rPr lang="en-US" sz="2400" dirty="0"/>
-              <a:t>Run the game:</a:t>
-            </a:r>
-          </a:p>
-          <a:p>
-            <a:pPr lvl="1"/>
-            <a:r>
-              <a:rPr lang="en-US" sz="2000" dirty="0"/>
-              <a:t>Command line: `python3 </a:t>
-            </a:r>
-            <a:r>
-              <a:rPr lang="en-US" sz="2000" dirty="0" err="1"/>
-              <a:t>main.py</a:t>
-            </a:r>
-            <a:r>
-              <a:rPr lang="en-US" sz="2000" dirty="0"/>
-              <a:t>`</a:t>
-            </a:r>
-          </a:p>
-        </p:txBody>
-      </p:sp>
+              <a:t> function is given in the file. Use this helper function as a search algorithm to find the shortest path and determine the next move</a:t>
+            </a:r>
+          </a:p>
+        </p:txBody>
+      </p:sp>
+      <p:pic>
+        <p:nvPicPr>
+          <p:cNvPr id="4" name="Picture 3">
+            <a:extLst>
+              <a:ext uri="{FF2B5EF4-FFF2-40B4-BE49-F238E27FC236}">
+                <a16:creationId xmlns:a16="http://schemas.microsoft.com/office/drawing/2014/main" id="{6027AF1D-50C8-149C-D1CA-F4D2290FD66C}"/>
+              </a:ext>
+            </a:extLst>
+          </p:cNvPr>
+          <p:cNvPicPr>
+            <a:picLocks noChangeAspect="1"/>
+          </p:cNvPicPr>
+          <p:nvPr/>
+        </p:nvPicPr>
+        <p:blipFill>
+          <a:blip r:embed="rId2"/>
+          <a:stretch>
+            <a:fillRect/>
+          </a:stretch>
+        </p:blipFill>
+        <p:spPr>
+          <a:xfrm>
+            <a:off x="5129645" y="3139392"/>
+            <a:ext cx="5884718" cy="3353483"/>
+          </a:xfrm>
+          <a:prstGeom prst="rect">
+            <a:avLst/>
+          </a:prstGeom>
+        </p:spPr>
+      </p:pic>
     </p:spTree>
     <p:extLst>
       <p:ext uri="{BB962C8B-B14F-4D97-AF65-F5344CB8AC3E}">
-        <p14:creationId xmlns:p14="http://schemas.microsoft.com/office/powerpoint/2010/main" val="2149089065"/>
+        <p14:creationId xmlns:p14="http://schemas.microsoft.com/office/powerpoint/2010/main" val="429266294"/>
       </p:ext>
     </p:extLst>
   </p:cSld>

</xml_diff>

<commit_message>
Update slides to reword some points
</commit_message>
<xml_diff>
--- a/slideshow/WLU_AR_Day_Activity_Instructions.pptx
+++ b/slideshow/WLU_AR_Day_Activity_Instructions.pptx
@@ -213,7 +213,7 @@
           <a:p>
             <a:fld id="{0AE82908-D569-E74B-B506-5DFEAB200A16}" type="datetimeFigureOut">
               <a:rPr lang="en-US" smtClean="0"/>
-              <a:t>2/21/25</a:t>
+              <a:t>2/25/25</a:t>
             </a:fld>
             <a:endParaRPr lang="en-US"/>
           </a:p>
@@ -795,7 +795,7 @@
           <a:p>
             <a:fld id="{9B66F5D3-20F9-0E4D-8AAD-873D65CA5B8C}" type="datetimeFigureOut">
               <a:rPr lang="en-US" smtClean="0"/>
-              <a:t>2/21/25</a:t>
+              <a:t>2/25/25</a:t>
             </a:fld>
             <a:endParaRPr lang="en-US"/>
           </a:p>
@@ -993,7 +993,7 @@
           <a:p>
             <a:fld id="{9B66F5D3-20F9-0E4D-8AAD-873D65CA5B8C}" type="datetimeFigureOut">
               <a:rPr lang="en-US" smtClean="0"/>
-              <a:t>2/21/25</a:t>
+              <a:t>2/25/25</a:t>
             </a:fld>
             <a:endParaRPr lang="en-US"/>
           </a:p>
@@ -1201,7 +1201,7 @@
           <a:p>
             <a:fld id="{9B66F5D3-20F9-0E4D-8AAD-873D65CA5B8C}" type="datetimeFigureOut">
               <a:rPr lang="en-US" smtClean="0"/>
-              <a:t>2/21/25</a:t>
+              <a:t>2/25/25</a:t>
             </a:fld>
             <a:endParaRPr lang="en-US"/>
           </a:p>
@@ -1399,7 +1399,7 @@
           <a:p>
             <a:fld id="{9B66F5D3-20F9-0E4D-8AAD-873D65CA5B8C}" type="datetimeFigureOut">
               <a:rPr lang="en-US" smtClean="0"/>
-              <a:t>2/21/25</a:t>
+              <a:t>2/25/25</a:t>
             </a:fld>
             <a:endParaRPr lang="en-US"/>
           </a:p>
@@ -1674,7 +1674,7 @@
           <a:p>
             <a:fld id="{9B66F5D3-20F9-0E4D-8AAD-873D65CA5B8C}" type="datetimeFigureOut">
               <a:rPr lang="en-US" smtClean="0"/>
-              <a:t>2/21/25</a:t>
+              <a:t>2/25/25</a:t>
             </a:fld>
             <a:endParaRPr lang="en-US"/>
           </a:p>
@@ -1939,7 +1939,7 @@
           <a:p>
             <a:fld id="{9B66F5D3-20F9-0E4D-8AAD-873D65CA5B8C}" type="datetimeFigureOut">
               <a:rPr lang="en-US" smtClean="0"/>
-              <a:t>2/21/25</a:t>
+              <a:t>2/25/25</a:t>
             </a:fld>
             <a:endParaRPr lang="en-US"/>
           </a:p>
@@ -2351,7 +2351,7 @@
           <a:p>
             <a:fld id="{9B66F5D3-20F9-0E4D-8AAD-873D65CA5B8C}" type="datetimeFigureOut">
               <a:rPr lang="en-US" smtClean="0"/>
-              <a:t>2/21/25</a:t>
+              <a:t>2/25/25</a:t>
             </a:fld>
             <a:endParaRPr lang="en-US"/>
           </a:p>
@@ -2492,7 +2492,7 @@
           <a:p>
             <a:fld id="{9B66F5D3-20F9-0E4D-8AAD-873D65CA5B8C}" type="datetimeFigureOut">
               <a:rPr lang="en-US" smtClean="0"/>
-              <a:t>2/21/25</a:t>
+              <a:t>2/25/25</a:t>
             </a:fld>
             <a:endParaRPr lang="en-US"/>
           </a:p>
@@ -2605,7 +2605,7 @@
           <a:p>
             <a:fld id="{9B66F5D3-20F9-0E4D-8AAD-873D65CA5B8C}" type="datetimeFigureOut">
               <a:rPr lang="en-US" smtClean="0"/>
-              <a:t>2/21/25</a:t>
+              <a:t>2/25/25</a:t>
             </a:fld>
             <a:endParaRPr lang="en-US"/>
           </a:p>
@@ -2916,7 +2916,7 @@
           <a:p>
             <a:fld id="{9B66F5D3-20F9-0E4D-8AAD-873D65CA5B8C}" type="datetimeFigureOut">
               <a:rPr lang="en-US" smtClean="0"/>
-              <a:t>2/21/25</a:t>
+              <a:t>2/25/25</a:t>
             </a:fld>
             <a:endParaRPr lang="en-US"/>
           </a:p>
@@ -3204,7 +3204,7 @@
           <a:p>
             <a:fld id="{9B66F5D3-20F9-0E4D-8AAD-873D65CA5B8C}" type="datetimeFigureOut">
               <a:rPr lang="en-US" smtClean="0"/>
-              <a:t>2/21/25</a:t>
+              <a:t>2/25/25</a:t>
             </a:fld>
             <a:endParaRPr lang="en-US"/>
           </a:p>
@@ -3445,7 +3445,7 @@
           <a:p>
             <a:fld id="{9B66F5D3-20F9-0E4D-8AAD-873D65CA5B8C}" type="datetimeFigureOut">
               <a:rPr lang="en-US" smtClean="0"/>
-              <a:t>2/21/25</a:t>
+              <a:t>2/25/25</a:t>
             </a:fld>
             <a:endParaRPr lang="en-US"/>
           </a:p>
@@ -4135,7 +4135,7 @@
           <a:p>
             <a:r>
               <a:rPr lang="en-US" dirty="0"/>
-              <a:t>How the Game Decides What to Run</a:t>
+              <a:t>Tips to Test Your Code</a:t>
             </a:r>
           </a:p>
         </p:txBody>
@@ -4158,81 +4158,25 @@
         </p:nvSpPr>
         <p:spPr>
           <a:xfrm>
-            <a:off x="838200" y="1825624"/>
+            <a:off x="838200" y="1576242"/>
             <a:ext cx="10515600" cy="4758055"/>
           </a:xfrm>
         </p:spPr>
         <p:txBody>
           <a:bodyPr>
-            <a:normAutofit fontScale="92500" lnSpcReduction="20000"/>
+            <a:normAutofit/>
           </a:bodyPr>
           <a:lstStyle/>
           <a:p>
+            <a:pPr marL="0" indent="0">
+              <a:buNone/>
+            </a:pPr>
+            <a:endParaRPr lang="en-US" dirty="0"/>
+          </a:p>
+          <a:p>
             <a:r>
               <a:rPr lang="en-US" dirty="0"/>
-              <a:t>In the top level directory of the game code is a file: </a:t>
-            </a:r>
-          </a:p>
-          <a:p>
-            <a:pPr lvl="1"/>
-            <a:r>
-              <a:rPr lang="en-US" dirty="0" err="1">
-                <a:solidFill>
-                  <a:srgbClr val="000000"/>
-                </a:solidFill>
-                <a:effectLst/>
-                <a:latin typeface="Menlo" panose="020B0609030804020204" pitchFamily="49" charset="0"/>
-              </a:rPr>
-              <a:t>player_agents_list.txt</a:t>
-            </a:r>
-            <a:endParaRPr lang="en-US" dirty="0">
-              <a:solidFill>
-                <a:srgbClr val="000000"/>
-              </a:solidFill>
-              <a:effectLst/>
-              <a:latin typeface="Menlo" panose="020B0609030804020204" pitchFamily="49" charset="0"/>
-            </a:endParaRPr>
-          </a:p>
-          <a:p>
-            <a:r>
-              <a:rPr lang="en-US" dirty="0"/>
-              <a:t>The </a:t>
-            </a:r>
-            <a:r>
-              <a:rPr lang="en-US" dirty="0" err="1"/>
-              <a:t>main.py</a:t>
-            </a:r>
-            <a:r>
-              <a:rPr lang="en-US" dirty="0"/>
-              <a:t> function will try to run all levels of the game for every agent class listed in this file</a:t>
-            </a:r>
-          </a:p>
-          <a:p>
-            <a:pPr lvl="1"/>
-            <a:r>
-              <a:rPr lang="en-US" dirty="0"/>
-              <a:t>Agents must be separated by a newline</a:t>
-            </a:r>
-          </a:p>
-          <a:p>
-            <a:r>
-              <a:rPr lang="en-US" dirty="0"/>
-              <a:t>If an agent fails a level, the remaining levels will not be run</a:t>
-            </a:r>
-          </a:p>
-          <a:p>
-            <a:endParaRPr lang="en-US" dirty="0"/>
-          </a:p>
-          <a:p>
-            <a:r>
-              <a:rPr lang="en-US" dirty="0"/>
-              <a:t>[TIP] To test your code faster, modify the agent list file to only have your agent</a:t>
-            </a:r>
-          </a:p>
-          <a:p>
-            <a:r>
-              <a:rPr lang="en-US" dirty="0"/>
-              <a:t>[TIP] The game currently runs at a speed of 5, adjust this parameter in </a:t>
+              <a:t>The game currently runs at a speed of 5, adjust the ` FPS_LIMIT` parameter in </a:t>
             </a:r>
             <a:r>
               <a:rPr lang="en-US" dirty="0" err="1"/>
@@ -4246,7 +4190,7 @@
           <a:p>
             <a:r>
               <a:rPr lang="en-US" dirty="0"/>
-              <a:t>[TIP] To test one level at a time, comment out unwanted levels in the GAME_LEVELS variable in </a:t>
+              <a:t>To test one level at a time, comment out unwanted levels in the GAME_LEVELS variable in </a:t>
             </a:r>
             <a:r>
               <a:rPr lang="en-US" dirty="0" err="1"/>
@@ -6821,15 +6765,7 @@
             </a:r>
             <a:r>
               <a:rPr lang="en-US" sz="2000" dirty="0"/>
-              <a:t>(id, </a:t>
-            </a:r>
-            <a:r>
-              <a:rPr lang="en-US" sz="2000" dirty="0" err="1"/>
-              <a:t>is_level_advanced_mode</a:t>
-            </a:r>
-            <a:r>
-              <a:rPr lang="en-US" sz="2000" dirty="0"/>
-              <a:t>)</a:t>
+              <a:t>(id)</a:t>
             </a:r>
           </a:p>
           <a:p>
@@ -6978,15 +6914,7 @@
             </a:r>
             <a:r>
               <a:rPr lang="en-US" sz="2000" dirty="0"/>
-              <a:t>__(id, </a:t>
-            </a:r>
-            <a:r>
-              <a:rPr lang="en-US" sz="2000" dirty="0" err="1"/>
-              <a:t>is_level_advanced_mode</a:t>
-            </a:r>
-            <a:r>
-              <a:rPr lang="en-US" sz="2000" dirty="0"/>
-              <a:t>):</a:t>
+              <a:t>__(id):</a:t>
             </a:r>
           </a:p>
           <a:p>
@@ -7429,13 +7357,6 @@
             <a:r>
               <a:rPr lang="en-US" dirty="0"/>
               <a:t> – Move 1 tile left (negative x direction)</a:t>
-            </a:r>
-          </a:p>
-          <a:p>
-            <a:pPr lvl="2"/>
-            <a:r>
-              <a:rPr lang="en-US" dirty="0"/>
-              <a:t>(Advanced mode only)</a:t>
             </a:r>
           </a:p>
           <a:p>

</xml_diff>

<commit_message>
Update slides to reorder slides
</commit_message>
<xml_diff>
--- a/slideshow/WLU_AR_Day_Activity_Instructions.pptx
+++ b/slideshow/WLU_AR_Day_Activity_Instructions.pptx
@@ -17,9 +17,9 @@
     <p:sldId id="259" r:id="rId8"/>
     <p:sldId id="264" r:id="rId9"/>
     <p:sldId id="266" r:id="rId10"/>
-    <p:sldId id="267" r:id="rId11"/>
+    <p:sldId id="272" r:id="rId11"/>
     <p:sldId id="268" r:id="rId12"/>
-    <p:sldId id="272" r:id="rId13"/>
+    <p:sldId id="267" r:id="rId13"/>
     <p:sldId id="271" r:id="rId14"/>
     <p:sldId id="263" r:id="rId15"/>
   </p:sldIdLst>
@@ -629,7 +629,7 @@
           <a:p>
             <a:fld id="{81079ACE-5C61-0541-A2A6-7B055A924A2A}" type="slidenum">
               <a:rPr lang="en-US" smtClean="0"/>
-              <a:t>12</a:t>
+              <a:t>10</a:t>
             </a:fld>
             <a:endParaRPr lang="en-US"/>
           </a:p>
@@ -3936,7 +3936,7 @@
           <p:cNvPr id="2" name="Title 1">
             <a:extLst>
               <a:ext uri="{FF2B5EF4-FFF2-40B4-BE49-F238E27FC236}">
-                <a16:creationId xmlns:a16="http://schemas.microsoft.com/office/drawing/2014/main" id="{53C7C39F-70A1-81DB-597D-C08787C03A25}"/>
+                <a16:creationId xmlns:a16="http://schemas.microsoft.com/office/drawing/2014/main" id="{C47278D4-F46F-FC18-56D7-7F3138510573}"/>
               </a:ext>
             </a:extLst>
           </p:cNvPr>
@@ -3954,7 +3954,7 @@
           <a:p>
             <a:r>
               <a:rPr lang="en-US" dirty="0"/>
-              <a:t>How to Run the Game </a:t>
+              <a:t>How the Game is Scored</a:t>
             </a:r>
           </a:p>
         </p:txBody>
@@ -3964,7 +3964,7 @@
           <p:cNvPr id="3" name="Content Placeholder 2">
             <a:extLst>
               <a:ext uri="{FF2B5EF4-FFF2-40B4-BE49-F238E27FC236}">
-                <a16:creationId xmlns:a16="http://schemas.microsoft.com/office/drawing/2014/main" id="{29B2C057-A096-F073-56F5-FEC9E0126DE3}"/>
+                <a16:creationId xmlns:a16="http://schemas.microsoft.com/office/drawing/2014/main" id="{1CC0F8E8-45AB-56C6-7EA1-5B76BB51A7CB}"/>
               </a:ext>
             </a:extLst>
           </p:cNvPr>
@@ -3977,8 +3977,8 @@
         </p:nvSpPr>
         <p:spPr>
           <a:xfrm>
-            <a:off x="838200" y="1612900"/>
-            <a:ext cx="10515600" cy="4879975"/>
+            <a:off x="838200" y="1825624"/>
+            <a:ext cx="10515600" cy="4758055"/>
           </a:xfrm>
         </p:spPr>
         <p:txBody>
@@ -3989,95 +3989,40 @@
           <a:p>
             <a:r>
               <a:rPr lang="en-US" dirty="0"/>
-              <a:t>Make sure you have Python installed (preferably 3.9 or later)</a:t>
+              <a:t>Each move costs 1 point, you want to have the lowest cost</a:t>
             </a:r>
           </a:p>
           <a:p>
             <a:pPr lvl="1"/>
             <a:r>
               <a:rPr lang="en-US" dirty="0"/>
-              <a:t>Check by running `python3 --version`</a:t>
-            </a:r>
-            <a:endParaRPr lang="en-US" dirty="0">
-              <a:hlinkClick r:id="rId2"/>
-            </a:endParaRPr>
+              <a:t>Score is displayed in the upper left corner of the game window</a:t>
+            </a:r>
+          </a:p>
+          <a:p>
+            <a:r>
+              <a:rPr lang="en-US" dirty="0"/>
+              <a:t>The game will timeout after 1000 turns</a:t>
+            </a:r>
+          </a:p>
+          <a:p>
+            <a:r>
+              <a:rPr lang="en-US" dirty="0"/>
+              <a:t>Agent scores are sorted in the following order:</a:t>
+            </a:r>
           </a:p>
           <a:p>
             <a:pPr lvl="1"/>
             <a:r>
-              <a:rPr lang="en-US" dirty="0">
-                <a:hlinkClick r:id="rId2"/>
-              </a:rPr>
-              <a:t>https://www.python.org/downloads/release/python-3115/</a:t>
-            </a:r>
-            <a:r>
               <a:rPr lang="en-US" dirty="0"/>
-              <a:t> </a:t>
-            </a:r>
-          </a:p>
-          <a:p>
+              <a:t>Number of levels completed</a:t>
+            </a:r>
+          </a:p>
+          <a:p>
+            <a:pPr lvl="1"/>
             <a:r>
               <a:rPr lang="en-US" dirty="0"/>
-              <a:t>Setup the game source code:</a:t>
-            </a:r>
-          </a:p>
-          <a:p>
-            <a:pPr lvl="1"/>
-            <a:r>
-              <a:rPr lang="en-US" dirty="0"/>
-              <a:t>Download or clone the starter code from </a:t>
-            </a:r>
-            <a:r>
-              <a:rPr lang="en-US" dirty="0">
-                <a:hlinkClick r:id="rId3"/>
-              </a:rPr>
-              <a:t>https://github.com/collinwzw/AR_Day_2025</a:t>
-            </a:r>
-            <a:endParaRPr lang="en-US" dirty="0"/>
-          </a:p>
-          <a:p>
-            <a:pPr lvl="1"/>
-            <a:r>
-              <a:rPr lang="en-US" dirty="0"/>
-              <a:t>cd into the directory</a:t>
-            </a:r>
-          </a:p>
-          <a:p>
-            <a:pPr lvl="1"/>
-            <a:r>
-              <a:rPr lang="en-US" dirty="0"/>
-              <a:t>Install requirements with `python3 -m pip install -r </a:t>
-            </a:r>
-            <a:r>
-              <a:rPr lang="en-US" dirty="0" err="1"/>
-              <a:t>requirements.txt</a:t>
-            </a:r>
-            <a:r>
-              <a:rPr lang="en-US" dirty="0"/>
-              <a:t>`</a:t>
-            </a:r>
-          </a:p>
-          <a:p>
-            <a:pPr lvl="1"/>
-            <a:r>
-              <a:rPr lang="en-US" dirty="0"/>
-              <a:t>Run the game with </a:t>
-            </a:r>
-            <a:r>
-              <a:rPr lang="en-US" sz="1800" dirty="0"/>
-              <a:t>`</a:t>
-            </a:r>
-            <a:r>
-              <a:rPr lang="en-US" sz="2000" dirty="0"/>
-              <a:t>python3 </a:t>
-            </a:r>
-            <a:r>
-              <a:rPr lang="en-US" sz="2000" dirty="0" err="1"/>
-              <a:t>main.py</a:t>
-            </a:r>
-            <a:r>
-              <a:rPr lang="en-US" sz="1800" dirty="0"/>
-              <a:t>`</a:t>
+              <a:t>Tiebreak: Score for last level</a:t>
             </a:r>
           </a:p>
         </p:txBody>
@@ -4085,7 +4030,7 @@
     </p:spTree>
     <p:extLst>
       <p:ext uri="{BB962C8B-B14F-4D97-AF65-F5344CB8AC3E}">
-        <p14:creationId xmlns:p14="http://schemas.microsoft.com/office/powerpoint/2010/main" val="2149089065"/>
+        <p14:creationId xmlns:p14="http://schemas.microsoft.com/office/powerpoint/2010/main" val="238152860"/>
       </p:ext>
     </p:extLst>
   </p:cSld>
@@ -4246,7 +4191,7 @@
           <p:cNvPr id="2" name="Title 1">
             <a:extLst>
               <a:ext uri="{FF2B5EF4-FFF2-40B4-BE49-F238E27FC236}">
-                <a16:creationId xmlns:a16="http://schemas.microsoft.com/office/drawing/2014/main" id="{C47278D4-F46F-FC18-56D7-7F3138510573}"/>
+                <a16:creationId xmlns:a16="http://schemas.microsoft.com/office/drawing/2014/main" id="{53C7C39F-70A1-81DB-597D-C08787C03A25}"/>
               </a:ext>
             </a:extLst>
           </p:cNvPr>
@@ -4264,7 +4209,7 @@
           <a:p>
             <a:r>
               <a:rPr lang="en-US" dirty="0"/>
-              <a:t>How the Game is Scored</a:t>
+              <a:t>How to Run the Game </a:t>
             </a:r>
           </a:p>
         </p:txBody>
@@ -4274,7 +4219,7 @@
           <p:cNvPr id="3" name="Content Placeholder 2">
             <a:extLst>
               <a:ext uri="{FF2B5EF4-FFF2-40B4-BE49-F238E27FC236}">
-                <a16:creationId xmlns:a16="http://schemas.microsoft.com/office/drawing/2014/main" id="{1CC0F8E8-45AB-56C6-7EA1-5B76BB51A7CB}"/>
+                <a16:creationId xmlns:a16="http://schemas.microsoft.com/office/drawing/2014/main" id="{29B2C057-A096-F073-56F5-FEC9E0126DE3}"/>
               </a:ext>
             </a:extLst>
           </p:cNvPr>
@@ -4287,8 +4232,8 @@
         </p:nvSpPr>
         <p:spPr>
           <a:xfrm>
-            <a:off x="838200" y="1825624"/>
-            <a:ext cx="10515600" cy="4758055"/>
+            <a:off x="838200" y="1612900"/>
+            <a:ext cx="10515600" cy="4879975"/>
           </a:xfrm>
         </p:spPr>
         <p:txBody>
@@ -4299,40 +4244,95 @@
           <a:p>
             <a:r>
               <a:rPr lang="en-US" dirty="0"/>
-              <a:t>Each move costs 1 point, you want to have the lowest cost</a:t>
+              <a:t>Make sure you have Python installed (preferably 3.9 or later)</a:t>
             </a:r>
           </a:p>
           <a:p>
             <a:pPr lvl="1"/>
             <a:r>
               <a:rPr lang="en-US" dirty="0"/>
-              <a:t>Score is displayed in the upper left corner of the game window</a:t>
-            </a:r>
-          </a:p>
-          <a:p>
+              <a:t>Check by running `python3 --version`</a:t>
+            </a:r>
+            <a:endParaRPr lang="en-US" dirty="0">
+              <a:hlinkClick r:id="rId2"/>
+            </a:endParaRPr>
+          </a:p>
+          <a:p>
+            <a:pPr lvl="1"/>
+            <a:r>
+              <a:rPr lang="en-US" dirty="0">
+                <a:hlinkClick r:id="rId2"/>
+              </a:rPr>
+              <a:t>https://www.python.org/downloads/release/python-3115/</a:t>
+            </a:r>
             <a:r>
               <a:rPr lang="en-US" dirty="0"/>
-              <a:t>The game will timeout after 1000 turns</a:t>
+              <a:t> </a:t>
             </a:r>
           </a:p>
           <a:p>
             <a:r>
               <a:rPr lang="en-US" dirty="0"/>
-              <a:t>Agent scores are sorted in the following order:</a:t>
+              <a:t>Setup the game source code:</a:t>
             </a:r>
           </a:p>
           <a:p>
             <a:pPr lvl="1"/>
             <a:r>
               <a:rPr lang="en-US" dirty="0"/>
-              <a:t>Number of levels completed</a:t>
-            </a:r>
+              <a:t>Download or clone the starter code from </a:t>
+            </a:r>
+            <a:r>
+              <a:rPr lang="en-US" dirty="0">
+                <a:hlinkClick r:id="rId3"/>
+              </a:rPr>
+              <a:t>https://github.com/collinwzw/AR_Day_2025</a:t>
+            </a:r>
+            <a:endParaRPr lang="en-US" dirty="0"/>
           </a:p>
           <a:p>
             <a:pPr lvl="1"/>
             <a:r>
               <a:rPr lang="en-US" dirty="0"/>
-              <a:t>Tiebreak: Score for last level</a:t>
+              <a:t>cd into the directory</a:t>
+            </a:r>
+          </a:p>
+          <a:p>
+            <a:pPr lvl="1"/>
+            <a:r>
+              <a:rPr lang="en-US" dirty="0"/>
+              <a:t>Install requirements with `python3 -m pip install -r </a:t>
+            </a:r>
+            <a:r>
+              <a:rPr lang="en-US" dirty="0" err="1"/>
+              <a:t>requirements.txt</a:t>
+            </a:r>
+            <a:r>
+              <a:rPr lang="en-US" dirty="0"/>
+              <a:t>`</a:t>
+            </a:r>
+          </a:p>
+          <a:p>
+            <a:pPr lvl="1"/>
+            <a:r>
+              <a:rPr lang="en-US" dirty="0"/>
+              <a:t>Run the game with </a:t>
+            </a:r>
+            <a:r>
+              <a:rPr lang="en-US" sz="1800" dirty="0"/>
+              <a:t>`</a:t>
+            </a:r>
+            <a:r>
+              <a:rPr lang="en-US" sz="2000" dirty="0"/>
+              <a:t>python3 </a:t>
+            </a:r>
+            <a:r>
+              <a:rPr lang="en-US" sz="2000" dirty="0" err="1"/>
+              <a:t>main.py</a:t>
+            </a:r>
+            <a:r>
+              <a:rPr lang="en-US" sz="1800" dirty="0"/>
+              <a:t>`</a:t>
             </a:r>
           </a:p>
         </p:txBody>
@@ -4340,7 +4340,7 @@
     </p:spTree>
     <p:extLst>
       <p:ext uri="{BB962C8B-B14F-4D97-AF65-F5344CB8AC3E}">
-        <p14:creationId xmlns:p14="http://schemas.microsoft.com/office/powerpoint/2010/main" val="238152860"/>
+        <p14:creationId xmlns:p14="http://schemas.microsoft.com/office/powerpoint/2010/main" val="2149089065"/>
       </p:ext>
     </p:extLst>
   </p:cSld>

</xml_diff>